<commit_message>
more small updates to labs and presentations
</commit_message>
<xml_diff>
--- a/pres-source/05-additional-tools.pptx
+++ b/pres-source/05-additional-tools.pptx
@@ -259,7 +259,7 @@
             <a:fld id="{7307762F-A706-E543-A832-3C298AA3103F}" type="datetimeFigureOut">
               <a:rPr lang="en-US" smtClean="0"/>
               <a:pPr/>
-              <a:t>2/25/20</a:t>
+              <a:t>2/27/20</a:t>
             </a:fld>
             <a:endParaRPr lang="en-US" dirty="0"/>
           </a:p>
@@ -1098,7 +1098,7 @@
           <a:p>
             <a:fld id="{875CF0EB-321F-0749-B37A-89BBA859503C}" type="datetimeFigureOut">
               <a:rPr lang="en-US" smtClean="0"/>
-              <a:t>2/25/20</a:t>
+              <a:t>2/27/20</a:t>
             </a:fld>
             <a:endParaRPr lang="en-US"/>
           </a:p>
@@ -1300,7 +1300,7 @@
           <a:p>
             <a:fld id="{875CF0EB-321F-0749-B37A-89BBA859503C}" type="datetimeFigureOut">
               <a:rPr lang="en-US" smtClean="0"/>
-              <a:t>2/25/20</a:t>
+              <a:t>2/27/20</a:t>
             </a:fld>
             <a:endParaRPr lang="en-US"/>
           </a:p>
@@ -1492,7 +1492,7 @@
           <a:p>
             <a:fld id="{875CF0EB-321F-0749-B37A-89BBA859503C}" type="datetimeFigureOut">
               <a:rPr lang="en-US" smtClean="0"/>
-              <a:t>2/25/20</a:t>
+              <a:t>2/27/20</a:t>
             </a:fld>
             <a:endParaRPr lang="en-US"/>
           </a:p>
@@ -1761,7 +1761,7 @@
           <a:p>
             <a:fld id="{875CF0EB-321F-0749-B37A-89BBA859503C}" type="datetimeFigureOut">
               <a:rPr lang="en-US" smtClean="0"/>
-              <a:t>2/25/20</a:t>
+              <a:t>2/27/20</a:t>
             </a:fld>
             <a:endParaRPr lang="en-US"/>
           </a:p>
@@ -2070,7 +2070,7 @@
           <a:p>
             <a:fld id="{875CF0EB-321F-0749-B37A-89BBA859503C}" type="datetimeFigureOut">
               <a:rPr lang="en-US" smtClean="0"/>
-              <a:t>2/25/20</a:t>
+              <a:t>2/27/20</a:t>
             </a:fld>
             <a:endParaRPr lang="en-US"/>
           </a:p>
@@ -2513,7 +2513,7 @@
           <a:p>
             <a:fld id="{875CF0EB-321F-0749-B37A-89BBA859503C}" type="datetimeFigureOut">
               <a:rPr lang="en-US" smtClean="0"/>
-              <a:t>2/25/20</a:t>
+              <a:t>2/27/20</a:t>
             </a:fld>
             <a:endParaRPr lang="en-US"/>
           </a:p>
@@ -2654,7 +2654,7 @@
           <a:p>
             <a:fld id="{875CF0EB-321F-0749-B37A-89BBA859503C}" type="datetimeFigureOut">
               <a:rPr lang="en-US" smtClean="0"/>
-              <a:t>2/25/20</a:t>
+              <a:t>2/27/20</a:t>
             </a:fld>
             <a:endParaRPr lang="en-US"/>
           </a:p>
@@ -2773,7 +2773,7 @@
           <a:p>
             <a:fld id="{875CF0EB-321F-0749-B37A-89BBA859503C}" type="datetimeFigureOut">
               <a:rPr lang="en-US" smtClean="0"/>
-              <a:t>2/25/20</a:t>
+              <a:t>2/27/20</a:t>
             </a:fld>
             <a:endParaRPr lang="en-US"/>
           </a:p>
@@ -3072,7 +3072,7 @@
           <a:p>
             <a:fld id="{875CF0EB-321F-0749-B37A-89BBA859503C}" type="datetimeFigureOut">
               <a:rPr lang="en-US" smtClean="0"/>
-              <a:t>2/25/20</a:t>
+              <a:t>2/27/20</a:t>
             </a:fld>
             <a:endParaRPr lang="en-US"/>
           </a:p>
@@ -3348,7 +3348,7 @@
           <a:p>
             <a:fld id="{875CF0EB-321F-0749-B37A-89BBA859503C}" type="datetimeFigureOut">
               <a:rPr lang="en-US" smtClean="0"/>
-              <a:t>2/25/20</a:t>
+              <a:t>2/27/20</a:t>
             </a:fld>
             <a:endParaRPr lang="en-US"/>
           </a:p>
@@ -3562,14 +3562,14 @@
           </a:ln>
           <a:extLst>
             <a:ext uri="{909E8E84-426E-40dd-AFC4-6F175D3DCCD1}">
-              <a14:hiddenFill xmlns:a14="http://schemas.microsoft.com/office/drawing/2010/main" xmlns="">
+              <a14:hiddenFill xmlns="" xmlns:a14="http://schemas.microsoft.com/office/drawing/2010/main">
                 <a:solidFill>
                   <a:srgbClr val="FFFFFF"/>
                 </a:solidFill>
               </a14:hiddenFill>
             </a:ext>
             <a:ext uri="{91240B29-F687-4f45-9708-019B960494DF}">
-              <a14:hiddenLine xmlns:a14="http://schemas.microsoft.com/office/drawing/2010/main" xmlns="" w="9525">
+              <a14:hiddenLine xmlns="" xmlns:a14="http://schemas.microsoft.com/office/drawing/2010/main" w="9525">
                 <a:solidFill>
                   <a:srgbClr val="000000"/>
                 </a:solidFill>
@@ -4123,14 +4123,14 @@
           <a:noFill/>
           <a:extLst>
             <a:ext uri="{909E8E84-426E-40dd-AFC4-6F175D3DCCD1}">
-              <a14:hiddenFill xmlns:a14="http://schemas.microsoft.com/office/drawing/2010/main" xmlns="">
+              <a14:hiddenFill xmlns="" xmlns:a14="http://schemas.microsoft.com/office/drawing/2010/main">
                 <a:solidFill>
                   <a:srgbClr val="FFFFFF"/>
                 </a:solidFill>
               </a14:hiddenFill>
             </a:ext>
             <a:ext uri="{91240B29-F687-4f45-9708-019B960494DF}">
-              <a14:hiddenLine xmlns:a14="http://schemas.microsoft.com/office/drawing/2010/main" xmlns="" w="9525">
+              <a14:hiddenLine xmlns="" xmlns:a14="http://schemas.microsoft.com/office/drawing/2010/main" w="9525">
                 <a:solidFill>
                   <a:srgbClr val="000000"/>
                 </a:solidFill>
@@ -4204,14 +4204,14 @@
           <a:noFill/>
           <a:extLst>
             <a:ext uri="{909E8E84-426E-40dd-AFC4-6F175D3DCCD1}">
-              <a14:hiddenFill xmlns:a14="http://schemas.microsoft.com/office/drawing/2010/main" xmlns="">
+              <a14:hiddenFill xmlns="" xmlns:a14="http://schemas.microsoft.com/office/drawing/2010/main">
                 <a:solidFill>
                   <a:srgbClr val="FFFFFF"/>
                 </a:solidFill>
               </a14:hiddenFill>
             </a:ext>
             <a:ext uri="{91240B29-F687-4f45-9708-019B960494DF}">
-              <a14:hiddenLine xmlns:a14="http://schemas.microsoft.com/office/drawing/2010/main" xmlns="" w="9525">
+              <a14:hiddenLine xmlns="" xmlns:a14="http://schemas.microsoft.com/office/drawing/2010/main" w="9525">
                 <a:solidFill>
                   <a:srgbClr val="000000"/>
                 </a:solidFill>
@@ -7193,14 +7193,20 @@
           <a:p>
             <a:r>
               <a:rPr lang="en-US" dirty="0"/>
-              <a:t>Infrastructure-as-a-Service</a:t>
+              <a:t>AWS: Infrastructure-as-a-Service</a:t>
             </a:r>
           </a:p>
         </p:txBody>
       </p:sp>
       <p:pic>
         <p:nvPicPr>
-          <p:cNvPr id="4" name="Picture 3"/>
+          <p:cNvPr id="5" name="Picture 4">
+            <a:extLst>
+              <a:ext uri="{FF2B5EF4-FFF2-40B4-BE49-F238E27FC236}">
+                <a16:creationId xmlns:a16="http://schemas.microsoft.com/office/drawing/2014/main" id="{B04449CE-F460-B148-BFDF-0DC8F9E8C176}"/>
+              </a:ext>
+            </a:extLst>
+          </p:cNvPr>
           <p:cNvPicPr>
             <a:picLocks noChangeAspect="1"/>
           </p:cNvPicPr>
@@ -7214,8 +7220,8 @@
         </p:blipFill>
         <p:spPr>
           <a:xfrm>
-            <a:off x="0" y="274638"/>
-            <a:ext cx="9144000" cy="5651560"/>
+            <a:off x="1286932" y="1291334"/>
+            <a:ext cx="5843105" cy="4989781"/>
           </a:xfrm>
           <a:prstGeom prst="rect">
             <a:avLst/>

</xml_diff>